<commit_message>
name - Commented GitLatch Commit @ 2022-12-28-7-14-24-83
</commit_message>
<xml_diff>
--- a/_______.pptx
+++ b/_______.pptx
@@ -3354,7 +3354,10 @@
           <a:bodyPr/>
           <a:lstStyle/>
           <a:p>
-            <a:endParaRPr lang="en-US"/>
+            <a:r>
+              <a:rPr lang="en-US"/>
+              <a:t>Test1234</a:t>
+            </a:r>
           </a:p>
         </p:txBody>
       </p:sp>

</xml_diff>

<commit_message>
test purpose - Commented GitLatch Commit @ 2023-1-17-11-16-29-870
</commit_message>
<xml_diff>
--- a/_______.pptx
+++ b/_______.pptx
@@ -263,7 +263,7 @@
           <a:p>
             <a:fld id="{73DD8245-91EB-468C-A659-F5B4B9F8B0C5}" type="datetimeFigureOut">
               <a:rPr lang="en-US" smtClean="0"/>
-              <a:t>12/28/2022</a:t>
+              <a:t>1/17/2023</a:t>
             </a:fld>
             <a:endParaRPr lang="en-US"/>
           </a:p>
@@ -461,7 +461,7 @@
           <a:p>
             <a:fld id="{73DD8245-91EB-468C-A659-F5B4B9F8B0C5}" type="datetimeFigureOut">
               <a:rPr lang="en-US" smtClean="0"/>
-              <a:t>12/28/2022</a:t>
+              <a:t>1/17/2023</a:t>
             </a:fld>
             <a:endParaRPr lang="en-US"/>
           </a:p>
@@ -669,7 +669,7 @@
           <a:p>
             <a:fld id="{73DD8245-91EB-468C-A659-F5B4B9F8B0C5}" type="datetimeFigureOut">
               <a:rPr lang="en-US" smtClean="0"/>
-              <a:t>12/28/2022</a:t>
+              <a:t>1/17/2023</a:t>
             </a:fld>
             <a:endParaRPr lang="en-US"/>
           </a:p>
@@ -867,7 +867,7 @@
           <a:p>
             <a:fld id="{73DD8245-91EB-468C-A659-F5B4B9F8B0C5}" type="datetimeFigureOut">
               <a:rPr lang="en-US" smtClean="0"/>
-              <a:t>12/28/2022</a:t>
+              <a:t>1/17/2023</a:t>
             </a:fld>
             <a:endParaRPr lang="en-US"/>
           </a:p>
@@ -1142,7 +1142,7 @@
           <a:p>
             <a:fld id="{73DD8245-91EB-468C-A659-F5B4B9F8B0C5}" type="datetimeFigureOut">
               <a:rPr lang="en-US" smtClean="0"/>
-              <a:t>12/28/2022</a:t>
+              <a:t>1/17/2023</a:t>
             </a:fld>
             <a:endParaRPr lang="en-US"/>
           </a:p>
@@ -1407,7 +1407,7 @@
           <a:p>
             <a:fld id="{73DD8245-91EB-468C-A659-F5B4B9F8B0C5}" type="datetimeFigureOut">
               <a:rPr lang="en-US" smtClean="0"/>
-              <a:t>12/28/2022</a:t>
+              <a:t>1/17/2023</a:t>
             </a:fld>
             <a:endParaRPr lang="en-US"/>
           </a:p>
@@ -1819,7 +1819,7 @@
           <a:p>
             <a:fld id="{73DD8245-91EB-468C-A659-F5B4B9F8B0C5}" type="datetimeFigureOut">
               <a:rPr lang="en-US" smtClean="0"/>
-              <a:t>12/28/2022</a:t>
+              <a:t>1/17/2023</a:t>
             </a:fld>
             <a:endParaRPr lang="en-US"/>
           </a:p>
@@ -1960,7 +1960,7 @@
           <a:p>
             <a:fld id="{73DD8245-91EB-468C-A659-F5B4B9F8B0C5}" type="datetimeFigureOut">
               <a:rPr lang="en-US" smtClean="0"/>
-              <a:t>12/28/2022</a:t>
+              <a:t>1/17/2023</a:t>
             </a:fld>
             <a:endParaRPr lang="en-US"/>
           </a:p>
@@ -2073,7 +2073,7 @@
           <a:p>
             <a:fld id="{73DD8245-91EB-468C-A659-F5B4B9F8B0C5}" type="datetimeFigureOut">
               <a:rPr lang="en-US" smtClean="0"/>
-              <a:t>12/28/2022</a:t>
+              <a:t>1/17/2023</a:t>
             </a:fld>
             <a:endParaRPr lang="en-US"/>
           </a:p>
@@ -2384,7 +2384,7 @@
           <a:p>
             <a:fld id="{73DD8245-91EB-468C-A659-F5B4B9F8B0C5}" type="datetimeFigureOut">
               <a:rPr lang="en-US" smtClean="0"/>
-              <a:t>12/28/2022</a:t>
+              <a:t>1/17/2023</a:t>
             </a:fld>
             <a:endParaRPr lang="en-US"/>
           </a:p>
@@ -2675,7 +2675,7 @@
           <a:p>
             <a:fld id="{73DD8245-91EB-468C-A659-F5B4B9F8B0C5}" type="datetimeFigureOut">
               <a:rPr lang="en-US" smtClean="0"/>
-              <a:t>12/28/2022</a:t>
+              <a:t>1/17/2023</a:t>
             </a:fld>
             <a:endParaRPr lang="en-US"/>
           </a:p>
@@ -2916,7 +2916,7 @@
           <a:p>
             <a:fld id="{73DD8245-91EB-468C-A659-F5B4B9F8B0C5}" type="datetimeFigureOut">
               <a:rPr lang="en-US" smtClean="0"/>
-              <a:t>12/28/2022</a:t>
+              <a:t>1/17/2023</a:t>
             </a:fld>
             <a:endParaRPr lang="en-US"/>
           </a:p>
@@ -3354,10 +3354,7 @@
           <a:bodyPr/>
           <a:lstStyle/>
           <a:p>
-            <a:r>
-              <a:rPr lang="en-US"/>
-              <a:t>Test1234</a:t>
-            </a:r>
+            <a:endParaRPr lang="en-US"/>
           </a:p>
         </p:txBody>
       </p:sp>

</xml_diff>

<commit_message>
test purpose1 - Commented GitLatch Commit @ 2023-1-17-11-17-36-257
</commit_message>
<xml_diff>
--- a/_______.pptx
+++ b/_______.pptx
@@ -3354,7 +3354,10 @@
           <a:bodyPr/>
           <a:lstStyle/>
           <a:p>
-            <a:endParaRPr lang="en-US"/>
+            <a:r>
+              <a:rPr lang="en-US"/>
+              <a:t>testing44</a:t>
+            </a:r>
           </a:p>
         </p:txBody>
       </p:sp>

</xml_diff>

<commit_message>
Commentless GitLatch Commit @ 2023-1-17-11-19-59-558
</commit_message>
<xml_diff>
--- a/_______.pptx
+++ b/_______.pptx
@@ -2,16 +2,16 @@
 <file path=ppt/presentation.xml><?xml version="1.0" encoding="utf-8"?>
 <p:presentation xmlns:a="http://schemas.openxmlformats.org/drawingml/2006/main" xmlns:r="http://schemas.openxmlformats.org/officeDocument/2006/relationships" xmlns:p="http://schemas.openxmlformats.org/presentationml/2006/main" saveSubsetFonts="1">
   <p:sldMasterIdLst>
-    <p:sldMasterId id="2147483648" r:id="rId1"/>
+    <p:sldMasterId id="2147483648" r:id="rId4"/>
   </p:sldMasterIdLst>
   <p:sldIdLst>
-    <p:sldId id="256" r:id="rId2"/>
-    <p:sldId id="257" r:id="rId3"/>
+    <p:sldId id="256" r:id="rId5"/>
+    <p:sldId id="257" r:id="rId6"/>
   </p:sldIdLst>
   <p:sldSz cx="12192000" cy="6858000"/>
   <p:notesSz cx="6858000" cy="9144000"/>
   <p:custDataLst>
-    <p:tags r:id="rId4"/>
+    <p:tags r:id="rId7"/>
   </p:custDataLst>
   <p:defaultTextStyle>
     <a:defPPr>
@@ -114,6 +114,14 @@
     </p:ext>
   </p:extLst>
 </p:presentation>
+</file>
+
+<file path=ppt/revisionInfo.xml><?xml version="1.0" encoding="utf-8"?>
+<p1510:revInfo xmlns:a="http://schemas.openxmlformats.org/drawingml/2006/main" xmlns:r="http://schemas.openxmlformats.org/officeDocument/2006/relationships" xmlns:p1510="http://schemas.microsoft.com/office/powerpoint/2015/10/main">
+  <p1510:revLst>
+    <p1510:client id="{8940D968-3367-42F6-BD5C-CEF388A355D6}" v="3" dt="2023-01-17T11:19:57.596"/>
+  </p1510:revLst>
+</p1510:revInfo>
 </file>
 
 <file path=ppt/slideLayouts/slideLayout1.xml><?xml version="1.0" encoding="utf-8"?>
@@ -3809,4 +3817,193 @@
   <we:bindings/>
   <we:snapshot xmlns:r="http://schemas.openxmlformats.org/officeDocument/2006/relationships"/>
 </we:webextension>
+</file>
+
+<file path=customXml/item1.xml><?xml version="1.0" encoding="utf-8"?>
+<ct:contentTypeSchema xmlns:ct="http://schemas.microsoft.com/office/2006/metadata/contentType" xmlns:ma="http://schemas.microsoft.com/office/2006/metadata/properties/metaAttributes" ct:_="" ma:_="" ma:contentTypeName="Document" ma:contentTypeID="0x010100CCEED9F5293CD84A87231578066A78AE" ma:contentTypeVersion="2" ma:contentTypeDescription="Create a new document." ma:contentTypeScope="" ma:versionID="d311b596c545208203047e6bafa96020">
+  <xsd:schema xmlns:xsd="http://www.w3.org/2001/XMLSchema" xmlns:xs="http://www.w3.org/2001/XMLSchema" xmlns:p="http://schemas.microsoft.com/office/2006/metadata/properties" xmlns:ns3="713894b6-e8ad-4b33-86a0-619976c92626" targetNamespace="http://schemas.microsoft.com/office/2006/metadata/properties" ma:root="true" ma:fieldsID="f9d63c49914a2afc49590a29771e503f" ns3:_="">
+    <xsd:import namespace="713894b6-e8ad-4b33-86a0-619976c92626"/>
+    <xsd:element name="properties">
+      <xsd:complexType>
+        <xsd:sequence>
+          <xsd:element name="documentManagement">
+            <xsd:complexType>
+              <xsd:all>
+                <xsd:element ref="ns3:MediaServiceMetadata" minOccurs="0"/>
+                <xsd:element ref="ns3:MediaServiceFastMetadata" minOccurs="0"/>
+              </xsd:all>
+            </xsd:complexType>
+          </xsd:element>
+        </xsd:sequence>
+      </xsd:complexType>
+    </xsd:element>
+  </xsd:schema>
+  <xsd:schema xmlns:xsd="http://www.w3.org/2001/XMLSchema" xmlns:xs="http://www.w3.org/2001/XMLSchema" xmlns:dms="http://schemas.microsoft.com/office/2006/documentManagement/types" xmlns:pc="http://schemas.microsoft.com/office/infopath/2007/PartnerControls" targetNamespace="713894b6-e8ad-4b33-86a0-619976c92626" elementFormDefault="qualified">
+    <xsd:import namespace="http://schemas.microsoft.com/office/2006/documentManagement/types"/>
+    <xsd:import namespace="http://schemas.microsoft.com/office/infopath/2007/PartnerControls"/>
+    <xsd:element name="MediaServiceMetadata" ma:index="8" nillable="true" ma:displayName="MediaServiceMetadata" ma:hidden="true" ma:internalName="MediaServiceMetadata" ma:readOnly="true">
+      <xsd:simpleType>
+        <xsd:restriction base="dms:Note"/>
+      </xsd:simpleType>
+    </xsd:element>
+    <xsd:element name="MediaServiceFastMetadata" ma:index="9" nillable="true" ma:displayName="MediaServiceFastMetadata" ma:hidden="true" ma:internalName="MediaServiceFastMetadata" ma:readOnly="true">
+      <xsd:simpleType>
+        <xsd:restriction base="dms:Note"/>
+      </xsd:simpleType>
+    </xsd:element>
+  </xsd:schema>
+  <xsd:schema xmlns="http://schemas.openxmlformats.org/package/2006/metadata/core-properties" xmlns:xsd="http://www.w3.org/2001/XMLSchema" xmlns:xsi="http://www.w3.org/2001/XMLSchema-instance" xmlns:dc="http://purl.org/dc/elements/1.1/" xmlns:dcterms="http://purl.org/dc/terms/" xmlns:odoc="http://schemas.microsoft.com/internal/obd" targetNamespace="http://schemas.openxmlformats.org/package/2006/metadata/core-properties" elementFormDefault="qualified" attributeFormDefault="unqualified" blockDefault="#all">
+    <xsd:import namespace="http://purl.org/dc/elements/1.1/" schemaLocation="http://dublincore.org/schemas/xmls/qdc/2003/04/02/dc.xsd"/>
+    <xsd:import namespace="http://purl.org/dc/terms/" schemaLocation="http://dublincore.org/schemas/xmls/qdc/2003/04/02/dcterms.xsd"/>
+    <xsd:element name="coreProperties" type="CT_coreProperties"/>
+    <xsd:complexType name="CT_coreProperties">
+      <xsd:all>
+        <xsd:element ref="dc:creator" minOccurs="0" maxOccurs="1"/>
+        <xsd:element ref="dcterms:created" minOccurs="0" maxOccurs="1"/>
+        <xsd:element ref="dc:identifier" minOccurs="0" maxOccurs="1"/>
+        <xsd:element name="contentType" minOccurs="0" maxOccurs="1" type="xsd:string" ma:index="0" ma:displayName="Content Type"/>
+        <xsd:element ref="dc:title" minOccurs="0" maxOccurs="1" ma:index="4" ma:displayName="Title"/>
+        <xsd:element ref="dc:subject" minOccurs="0" maxOccurs="1"/>
+        <xsd:element ref="dc:description" minOccurs="0" maxOccurs="1"/>
+        <xsd:element name="keywords" minOccurs="0" maxOccurs="1" type="xsd:string"/>
+        <xsd:element ref="dc:language" minOccurs="0" maxOccurs="1"/>
+        <xsd:element name="category" minOccurs="0" maxOccurs="1" type="xsd:string"/>
+        <xsd:element name="version" minOccurs="0" maxOccurs="1" type="xsd:string"/>
+        <xsd:element name="revision" minOccurs="0" maxOccurs="1" type="xsd:string">
+          <xsd:annotation>
+            <xsd:documentation>
+                        This value indicates the number of saves or revisions. The application is responsible for updating this value after each revision.
+                    </xsd:documentation>
+          </xsd:annotation>
+        </xsd:element>
+        <xsd:element name="lastModifiedBy" minOccurs="0" maxOccurs="1" type="xsd:string"/>
+        <xsd:element ref="dcterms:modified" minOccurs="0" maxOccurs="1"/>
+        <xsd:element name="contentStatus" minOccurs="0" maxOccurs="1" type="xsd:string"/>
+      </xsd:all>
+    </xsd:complexType>
+  </xsd:schema>
+  <xs:schema xmlns:pc="http://schemas.microsoft.com/office/infopath/2007/PartnerControls" xmlns:xs="http://www.w3.org/2001/XMLSchema" targetNamespace="http://schemas.microsoft.com/office/infopath/2007/PartnerControls" elementFormDefault="qualified" attributeFormDefault="unqualified">
+    <xs:element name="Person">
+      <xs:complexType>
+        <xs:sequence>
+          <xs:element ref="pc:DisplayName" minOccurs="0"/>
+          <xs:element ref="pc:AccountId" minOccurs="0"/>
+          <xs:element ref="pc:AccountType" minOccurs="0"/>
+        </xs:sequence>
+      </xs:complexType>
+    </xs:element>
+    <xs:element name="DisplayName" type="xs:string"/>
+    <xs:element name="AccountId" type="xs:string"/>
+    <xs:element name="AccountType" type="xs:string"/>
+    <xs:element name="BDCAssociatedEntity">
+      <xs:complexType>
+        <xs:sequence>
+          <xs:element ref="pc:BDCEntity" minOccurs="0" maxOccurs="unbounded"/>
+        </xs:sequence>
+        <xs:attribute ref="pc:EntityNamespace"/>
+        <xs:attribute ref="pc:EntityName"/>
+        <xs:attribute ref="pc:SystemInstanceName"/>
+        <xs:attribute ref="pc:AssociationName"/>
+      </xs:complexType>
+    </xs:element>
+    <xs:attribute name="EntityNamespace" type="xs:string"/>
+    <xs:attribute name="EntityName" type="xs:string"/>
+    <xs:attribute name="SystemInstanceName" type="xs:string"/>
+    <xs:attribute name="AssociationName" type="xs:string"/>
+    <xs:element name="BDCEntity">
+      <xs:complexType>
+        <xs:sequence>
+          <xs:element ref="pc:EntityDisplayName" minOccurs="0"/>
+          <xs:element ref="pc:EntityInstanceReference" minOccurs="0"/>
+          <xs:element ref="pc:EntityId1" minOccurs="0"/>
+          <xs:element ref="pc:EntityId2" minOccurs="0"/>
+          <xs:element ref="pc:EntityId3" minOccurs="0"/>
+          <xs:element ref="pc:EntityId4" minOccurs="0"/>
+          <xs:element ref="pc:EntityId5" minOccurs="0"/>
+        </xs:sequence>
+      </xs:complexType>
+    </xs:element>
+    <xs:element name="EntityDisplayName" type="xs:string"/>
+    <xs:element name="EntityInstanceReference" type="xs:string"/>
+    <xs:element name="EntityId1" type="xs:string"/>
+    <xs:element name="EntityId2" type="xs:string"/>
+    <xs:element name="EntityId3" type="xs:string"/>
+    <xs:element name="EntityId4" type="xs:string"/>
+    <xs:element name="EntityId5" type="xs:string"/>
+    <xs:element name="Terms">
+      <xs:complexType>
+        <xs:sequence>
+          <xs:element ref="pc:TermInfo" minOccurs="0" maxOccurs="unbounded"/>
+        </xs:sequence>
+      </xs:complexType>
+    </xs:element>
+    <xs:element name="TermInfo">
+      <xs:complexType>
+        <xs:sequence>
+          <xs:element ref="pc:TermName" minOccurs="0"/>
+          <xs:element ref="pc:TermId" minOccurs="0"/>
+        </xs:sequence>
+      </xs:complexType>
+    </xs:element>
+    <xs:element name="TermName" type="xs:string"/>
+    <xs:element name="TermId" type="xs:string"/>
+  </xs:schema>
+</ct:contentTypeSchema>
+</file>
+
+<file path=customXml/item2.xml><?xml version="1.0" encoding="utf-8"?>
+<?mso-contentType ?>
+<FormTemplates xmlns="http://schemas.microsoft.com/sharepoint/v3/contenttype/forms">
+  <Display>DocumentLibraryForm</Display>
+  <Edit>DocumentLibraryForm</Edit>
+  <New>DocumentLibraryForm</New>
+</FormTemplates>
+</file>
+
+<file path=customXml/item3.xml><?xml version="1.0" encoding="utf-8"?>
+<p:properties xmlns:p="http://schemas.microsoft.com/office/2006/metadata/properties" xmlns:xsi="http://www.w3.org/2001/XMLSchema-instance" xmlns:pc="http://schemas.microsoft.com/office/infopath/2007/PartnerControls">
+  <documentManagement/>
+</p:properties>
+</file>
+
+<file path=customXml/itemProps1.xml><?xml version="1.0" encoding="utf-8"?>
+<ds:datastoreItem xmlns:ds="http://schemas.openxmlformats.org/officeDocument/2006/customXml" ds:itemID="{A94DF851-C7C1-492A-A91B-5B3FACDAF013}">
+  <ds:schemaRefs>
+    <ds:schemaRef ds:uri="http://schemas.microsoft.com/office/2006/metadata/contentType"/>
+    <ds:schemaRef ds:uri="http://schemas.microsoft.com/office/2006/metadata/properties/metaAttributes"/>
+    <ds:schemaRef ds:uri="http://www.w3.org/2001/XMLSchema"/>
+    <ds:schemaRef ds:uri="http://schemas.microsoft.com/office/2006/metadata/properties"/>
+    <ds:schemaRef ds:uri="713894b6-e8ad-4b33-86a0-619976c92626"/>
+    <ds:schemaRef ds:uri="http://schemas.microsoft.com/office/2006/documentManagement/types"/>
+    <ds:schemaRef ds:uri="http://schemas.microsoft.com/office/infopath/2007/PartnerControls"/>
+    <ds:schemaRef ds:uri="http://schemas.openxmlformats.org/package/2006/metadata/core-properties"/>
+    <ds:schemaRef ds:uri="http://purl.org/dc/elements/1.1/"/>
+    <ds:schemaRef ds:uri="http://purl.org/dc/terms/"/>
+    <ds:schemaRef ds:uri="http://schemas.microsoft.com/internal/obd"/>
+  </ds:schemaRefs>
+</ds:datastoreItem>
+</file>
+
+<file path=customXml/itemProps2.xml><?xml version="1.0" encoding="utf-8"?>
+<ds:datastoreItem xmlns:ds="http://schemas.openxmlformats.org/officeDocument/2006/customXml" ds:itemID="{9E7708F8-BC88-436F-A937-5FED58CA66DE}">
+  <ds:schemaRefs>
+    <ds:schemaRef ds:uri="http://schemas.microsoft.com/sharepoint/v3/contenttype/forms"/>
+  </ds:schemaRefs>
+</ds:datastoreItem>
+</file>
+
+<file path=customXml/itemProps3.xml><?xml version="1.0" encoding="utf-8"?>
+<ds:datastoreItem xmlns:ds="http://schemas.openxmlformats.org/officeDocument/2006/customXml" ds:itemID="{79DE7570-29DF-4A0A-9C15-397E2F47D746}">
+  <ds:schemaRefs>
+    <ds:schemaRef ds:uri="http://purl.org/dc/elements/1.1/"/>
+    <ds:schemaRef ds:uri="http://schemas.microsoft.com/office/2006/documentManagement/types"/>
+    <ds:schemaRef ds:uri="http://schemas.microsoft.com/office/2006/metadata/properties"/>
+    <ds:schemaRef ds:uri="http://www.w3.org/XML/1998/namespace"/>
+    <ds:schemaRef ds:uri="http://purl.org/dc/terms/"/>
+    <ds:schemaRef ds:uri="http://schemas.openxmlformats.org/package/2006/metadata/core-properties"/>
+    <ds:schemaRef ds:uri="http://purl.org/dc/dcmitype/"/>
+    <ds:schemaRef ds:uri="http://schemas.microsoft.com/office/infopath/2007/PartnerControls"/>
+    <ds:schemaRef ds:uri="713894b6-e8ad-4b33-86a0-619976c92626"/>
+  </ds:schemaRefs>
+</ds:datastoreItem>
 </file>
</xml_diff>

<commit_message>
changes success test - Commented GitLatch Commit @ 2023-1-17-11-22-13-681
</commit_message>
<xml_diff>
--- a/_______.pptx
+++ b/_______.pptx
@@ -119,7 +119,7 @@
 <file path=ppt/revisionInfo.xml><?xml version="1.0" encoding="utf-8"?>
 <p1510:revInfo xmlns:a="http://schemas.openxmlformats.org/drawingml/2006/main" xmlns:r="http://schemas.openxmlformats.org/officeDocument/2006/relationships" xmlns:p1510="http://schemas.microsoft.com/office/powerpoint/2015/10/main">
   <p1510:revLst>
-    <p1510:client id="{8940D968-3367-42F6-BD5C-CEF388A355D6}" v="7" dt="2023-01-17T11:20:40.506"/>
+    <p1510:client id="{8940D968-3367-42F6-BD5C-CEF388A355D6}" v="14" dt="2023-01-17T11:22:10.791"/>
   </p1510:revLst>
 </p1510:revInfo>
 </file>
@@ -3499,8 +3499,8 @@
   <p:tag name="GITLATCHSETTINGSCP.OWNERNAME" val="Test1135"/>
   <p:tag name="GITLATCHSETTINGSCP.REPONAME" val="testaddin"/>
   <p:tag name="GITLATCHSETTINGSCP.BRANCH" val="gitlatch"/>
+  <p:tag name="GITLATCHSETTINGSCP.AUTOSHOW" val="YES"/>
   <p:tag name="GITLATCHSETTINGSCP.FILENAME" val="_______"/>
-  <p:tag name="GITLATCHSETTINGSCP.AUTOSHOW" val="YES"/>
 </p:tagLst>
 </file>
 

</xml_diff>

<commit_message>
changes success test - Commented GitLatch Commit @ 2023-1-17-11-23-23-64
</commit_message>
<xml_diff>
--- a/_______.pptx
+++ b/_______.pptx
@@ -119,7 +119,7 @@
 <file path=ppt/revisionInfo.xml><?xml version="1.0" encoding="utf-8"?>
 <p1510:revInfo xmlns:a="http://schemas.openxmlformats.org/drawingml/2006/main" xmlns:r="http://schemas.openxmlformats.org/officeDocument/2006/relationships" xmlns:p1510="http://schemas.microsoft.com/office/powerpoint/2015/10/main">
   <p1510:revLst>
-    <p1510:client id="{8940D968-3367-42F6-BD5C-CEF388A355D6}" v="14" dt="2023-01-17T11:22:10.791"/>
+    <p1510:client id="{8940D968-3367-42F6-BD5C-CEF388A355D6}" v="21" dt="2023-01-17T11:23:05.791"/>
   </p1510:revLst>
 </p1510:revInfo>
 </file>
@@ -3499,8 +3499,8 @@
   <p:tag name="GITLATCHSETTINGSCP.OWNERNAME" val="Test1135"/>
   <p:tag name="GITLATCHSETTINGSCP.REPONAME" val="testaddin"/>
   <p:tag name="GITLATCHSETTINGSCP.BRANCH" val="gitlatch"/>
+  <p:tag name="GITLATCHSETTINGSCP.FILENAME" val="_______"/>
   <p:tag name="GITLATCHSETTINGSCP.AUTOSHOW" val="YES"/>
-  <p:tag name="GITLATCHSETTINGSCP.FILENAME" val="_______"/>
 </p:tagLst>
 </file>
 

</xml_diff>